<commit_message>
Fix infrastructure costs, solution briefing logos, and SOW sign-off formatting
- Infrastructure Costs: Fix sheet names to match solution-template (mixed case)
- Infrastructure Costs: Increase Unit column width from 15 to 16 (5% rounded)
- Infrastructure Costs: Update metadata in disaster-recovery and onpremise-migration
- Solution Briefing: Fix logo paths to reference solution-local assets (../../assets/logos/)
- Statement of Work: Add sign-off table header vertical centering and subtle bottom padding
- Regenerate all 10 Office documents with fixes applied
</commit_message>
<xml_diff>
--- a/solutions/aws/cloud/disaster-recovery-web-application/presales/solution-briefing.pptx
+++ b/solutions/aws/cloud/disaster-recovery-web-application/presales/solution-briefing.pptx
@@ -3214,18 +3214,6 @@
       <p:grpSpPr/>
       <p:sp>
         <p:nvSpPr>
-          <p:cNvPr id="2" name="Picture Placeholder 1"/>
-          <p:cNvSpPr>
-            <a:spLocks noGrp="1"/>
-          </p:cNvSpPr>
-          <p:nvPr>
-            <p:ph type="pic" idx="10" sz="quarter"/>
-          </p:nvPr>
-        </p:nvSpPr>
-        <p:spPr/>
-      </p:sp>
-      <p:sp>
-        <p:nvSpPr>
           <p:cNvPr id="3" name="Text Placeholder 2"/>
           <p:cNvSpPr>
             <a:spLocks noGrp="1"/>
@@ -3247,18 +3235,6 @@
       </p:sp>
       <p:sp>
         <p:nvSpPr>
-          <p:cNvPr id="4" name="Picture Placeholder 3"/>
-          <p:cNvSpPr>
-            <a:spLocks noGrp="1"/>
-          </p:cNvSpPr>
-          <p:nvPr>
-            <p:ph type="pic" idx="13" sz="quarter"/>
-          </p:nvPr>
-        </p:nvSpPr>
-        <p:spPr/>
-      </p:sp>
-      <p:sp>
-        <p:nvSpPr>
           <p:cNvPr id="5" name="Text Placeholder 4"/>
           <p:cNvSpPr>
             <a:spLocks noGrp="1"/>
@@ -3299,6 +3275,78 @@
           </a:p>
         </p:txBody>
       </p:sp>
+      <p:pic>
+        <p:nvPicPr>
+          <p:cNvPr id="7" name="Picture 6" descr="client_logo.png"/>
+          <p:cNvPicPr>
+            <a:picLocks noChangeAspect="1"/>
+          </p:cNvPicPr>
+          <p:nvPr/>
+        </p:nvPicPr>
+        <p:blipFill>
+          <a:blip r:embed="rId2"/>
+          <a:stretch>
+            <a:fillRect/>
+          </a:stretch>
+        </p:blipFill>
+        <p:spPr>
+          <a:xfrm>
+            <a:off x="2180492" y="171206"/>
+            <a:ext cx="3978520" cy="1314694"/>
+          </a:xfrm>
+          <a:prstGeom prst="rect">
+            <a:avLst/>
+          </a:prstGeom>
+        </p:spPr>
+      </p:pic>
+      <p:pic>
+        <p:nvPicPr>
+          <p:cNvPr id="8" name="Picture 7" descr="consulting_company_logo.png"/>
+          <p:cNvPicPr>
+            <a:picLocks noChangeAspect="1"/>
+          </p:cNvPicPr>
+          <p:nvPr/>
+        </p:nvPicPr>
+        <p:blipFill>
+          <a:blip r:embed="rId3"/>
+          <a:stretch>
+            <a:fillRect/>
+          </a:stretch>
+        </p:blipFill>
+        <p:spPr>
+          <a:xfrm>
+            <a:off x="313591" y="4536078"/>
+            <a:ext cx="2099897" cy="529698"/>
+          </a:xfrm>
+          <a:prstGeom prst="rect">
+            <a:avLst/>
+          </a:prstGeom>
+        </p:spPr>
+      </p:pic>
+      <p:pic>
+        <p:nvPicPr>
+          <p:cNvPr id="9" name="Picture 8" descr="eo-framework-logo-real.png"/>
+          <p:cNvPicPr>
+            <a:picLocks noChangeAspect="1"/>
+          </p:cNvPicPr>
+          <p:nvPr/>
+        </p:nvPicPr>
+        <p:blipFill>
+          <a:blip r:embed="rId4"/>
+          <a:stretch>
+            <a:fillRect/>
+          </a:stretch>
+        </p:blipFill>
+        <p:spPr>
+          <a:xfrm>
+            <a:off x="6684264" y="4535424"/>
+            <a:ext cx="2139696" cy="530352"/>
+          </a:xfrm>
+          <a:prstGeom prst="rect">
+            <a:avLst/>
+          </a:prstGeom>
+        </p:spPr>
+      </p:pic>
     </p:spTree>
   </p:cSld>
   <p:clrMapOvr>
@@ -3341,18 +3389,6 @@
       </p:sp>
       <p:sp>
         <p:nvSpPr>
-          <p:cNvPr id="3" name="Picture Placeholder 2"/>
-          <p:cNvSpPr>
-            <a:spLocks noGrp="1"/>
-          </p:cNvSpPr>
-          <p:nvPr>
-            <p:ph type="pic" idx="13" sz="quarter"/>
-          </p:nvPr>
-        </p:nvSpPr>
-        <p:spPr/>
-      </p:sp>
-      <p:sp>
-        <p:nvSpPr>
           <p:cNvPr id="4" name="Text Placeholder 3"/>
           <p:cNvSpPr>
             <a:spLocks noGrp="1"/>
@@ -3446,6 +3482,30 @@
           </a:p>
         </p:txBody>
       </p:sp>
+      <p:pic>
+        <p:nvPicPr>
+          <p:cNvPr id="6" name="Picture 5" descr="consulting_company_logo.png"/>
+          <p:cNvPicPr>
+            <a:picLocks noChangeAspect="1"/>
+          </p:cNvPicPr>
+          <p:nvPr/>
+        </p:nvPicPr>
+        <p:blipFill>
+          <a:blip r:embed="rId2"/>
+          <a:stretch>
+            <a:fillRect/>
+          </a:stretch>
+        </p:blipFill>
+        <p:spPr>
+          <a:xfrm>
+            <a:off x="313593" y="4536078"/>
+            <a:ext cx="2143858" cy="529698"/>
+          </a:xfrm>
+          <a:prstGeom prst="rect">
+            <a:avLst/>
+          </a:prstGeom>
+        </p:spPr>
+      </p:pic>
     </p:spTree>
   </p:cSld>
   <p:clrMapOvr>
@@ -3466,18 +3526,6 @@
       <p:grpSpPr/>
       <p:sp>
         <p:nvSpPr>
-          <p:cNvPr id="2" name="Picture Placeholder 1"/>
-          <p:cNvSpPr>
-            <a:spLocks noGrp="1"/>
-          </p:cNvSpPr>
-          <p:nvPr>
-            <p:ph type="pic" idx="10" sz="quarter"/>
-          </p:nvPr>
-        </p:nvSpPr>
-        <p:spPr/>
-      </p:sp>
-      <p:sp>
-        <p:nvSpPr>
           <p:cNvPr id="3" name="Text Placeholder 2"/>
           <p:cNvSpPr>
             <a:spLocks noGrp="1"/>
@@ -3499,18 +3547,6 @@
       </p:sp>
       <p:sp>
         <p:nvSpPr>
-          <p:cNvPr id="4" name="Picture Placeholder 3"/>
-          <p:cNvSpPr>
-            <a:spLocks noGrp="1"/>
-          </p:cNvSpPr>
-          <p:nvPr>
-            <p:ph type="pic" idx="13" sz="quarter"/>
-          </p:nvPr>
-        </p:nvSpPr>
-        <p:spPr/>
-      </p:sp>
-      <p:sp>
-        <p:nvSpPr>
           <p:cNvPr id="5" name="Text Placeholder 4"/>
           <p:cNvSpPr>
             <a:spLocks noGrp="1"/>
@@ -3543,6 +3579,78 @@
           <a:p/>
         </p:txBody>
       </p:sp>
+      <p:pic>
+        <p:nvPicPr>
+          <p:cNvPr id="7" name="Picture 6" descr="client_logo.png"/>
+          <p:cNvPicPr>
+            <a:picLocks noChangeAspect="1"/>
+          </p:cNvPicPr>
+          <p:nvPr/>
+        </p:nvPicPr>
+        <p:blipFill>
+          <a:blip r:embed="rId2"/>
+          <a:stretch>
+            <a:fillRect/>
+          </a:stretch>
+        </p:blipFill>
+        <p:spPr>
+          <a:xfrm>
+            <a:off x="2180492" y="171206"/>
+            <a:ext cx="3978520" cy="1314694"/>
+          </a:xfrm>
+          <a:prstGeom prst="rect">
+            <a:avLst/>
+          </a:prstGeom>
+        </p:spPr>
+      </p:pic>
+      <p:pic>
+        <p:nvPicPr>
+          <p:cNvPr id="8" name="Picture 7" descr="consulting_company_logo.png"/>
+          <p:cNvPicPr>
+            <a:picLocks noChangeAspect="1"/>
+          </p:cNvPicPr>
+          <p:nvPr/>
+        </p:nvPicPr>
+        <p:blipFill>
+          <a:blip r:embed="rId3"/>
+          <a:stretch>
+            <a:fillRect/>
+          </a:stretch>
+        </p:blipFill>
+        <p:spPr>
+          <a:xfrm>
+            <a:off x="313592" y="4536078"/>
+            <a:ext cx="2164114" cy="529698"/>
+          </a:xfrm>
+          <a:prstGeom prst="rect">
+            <a:avLst/>
+          </a:prstGeom>
+        </p:spPr>
+      </p:pic>
+      <p:pic>
+        <p:nvPicPr>
+          <p:cNvPr id="9" name="Picture 8" descr="eo-framework-logo-real.png"/>
+          <p:cNvPicPr>
+            <a:picLocks noChangeAspect="1"/>
+          </p:cNvPicPr>
+          <p:nvPr/>
+        </p:nvPicPr>
+        <p:blipFill>
+          <a:blip r:embed="rId4"/>
+          <a:stretch>
+            <a:fillRect/>
+          </a:stretch>
+        </p:blipFill>
+        <p:spPr>
+          <a:xfrm>
+            <a:off x="6684264" y="4535424"/>
+            <a:ext cx="2139696" cy="530352"/>
+          </a:xfrm>
+          <a:prstGeom prst="rect">
+            <a:avLst/>
+          </a:prstGeom>
+        </p:spPr>
+      </p:pic>
     </p:spTree>
   </p:cSld>
   <p:clrMapOvr>
@@ -3585,18 +3693,6 @@
       </p:sp>
       <p:sp>
         <p:nvSpPr>
-          <p:cNvPr id="3" name="Picture Placeholder 2"/>
-          <p:cNvSpPr>
-            <a:spLocks noGrp="1"/>
-          </p:cNvSpPr>
-          <p:nvPr>
-            <p:ph type="pic" idx="14" sz="quarter"/>
-          </p:nvPr>
-        </p:nvSpPr>
-        <p:spPr/>
-      </p:sp>
-      <p:sp>
-        <p:nvSpPr>
           <p:cNvPr id="4" name="Text Placeholder 3"/>
           <p:cNvSpPr>
             <a:spLocks noGrp="1"/>
@@ -3706,6 +3802,30 @@
           </a:p>
         </p:txBody>
       </p:sp>
+      <p:pic>
+        <p:nvPicPr>
+          <p:cNvPr id="7" name="Picture 6" descr="consulting_company_logo.png"/>
+          <p:cNvPicPr>
+            <a:picLocks noChangeAspect="1"/>
+          </p:cNvPicPr>
+          <p:nvPr/>
+        </p:nvPicPr>
+        <p:blipFill>
+          <a:blip r:embed="rId2"/>
+          <a:stretch>
+            <a:fillRect/>
+          </a:stretch>
+        </p:blipFill>
+        <p:spPr>
+          <a:xfrm>
+            <a:off x="313592" y="4536078"/>
+            <a:ext cx="2121877" cy="529698"/>
+          </a:xfrm>
+          <a:prstGeom prst="rect">
+            <a:avLst/>
+          </a:prstGeom>
+        </p:spPr>
+      </p:pic>
     </p:spTree>
   </p:cSld>
   <p:clrMapOvr>
@@ -3745,18 +3865,6 @@
             </a:r>
           </a:p>
         </p:txBody>
-      </p:sp>
-      <p:sp>
-        <p:nvSpPr>
-          <p:cNvPr id="3" name="Picture Placeholder 2"/>
-          <p:cNvSpPr>
-            <a:spLocks noGrp="1"/>
-          </p:cNvSpPr>
-          <p:nvPr>
-            <p:ph type="pic" idx="13" sz="quarter"/>
-          </p:nvPr>
-        </p:nvSpPr>
-        <p:spPr/>
       </p:sp>
       <p:graphicFrame>
         <p:nvGraphicFramePr>
@@ -4572,6 +4680,30 @@
           </a:p>
         </p:txBody>
       </p:sp>
+      <p:pic>
+        <p:nvPicPr>
+          <p:cNvPr id="6" name="Picture 5" descr="consulting_company_logo.png"/>
+          <p:cNvPicPr>
+            <a:picLocks noChangeAspect="1"/>
+          </p:cNvPicPr>
+          <p:nvPr/>
+        </p:nvPicPr>
+        <p:blipFill>
+          <a:blip r:embed="rId2"/>
+          <a:stretch>
+            <a:fillRect/>
+          </a:stretch>
+        </p:blipFill>
+        <p:spPr>
+          <a:xfrm>
+            <a:off x="313592" y="4536078"/>
+            <a:ext cx="2126273" cy="529698"/>
+          </a:xfrm>
+          <a:prstGeom prst="rect">
+            <a:avLst/>
+          </a:prstGeom>
+        </p:spPr>
+      </p:pic>
     </p:spTree>
   </p:cSld>
   <p:clrMapOvr>
@@ -4611,18 +4743,6 @@
             </a:r>
           </a:p>
         </p:txBody>
-      </p:sp>
-      <p:sp>
-        <p:nvSpPr>
-          <p:cNvPr id="3" name="Picture Placeholder 2"/>
-          <p:cNvSpPr>
-            <a:spLocks noGrp="1"/>
-          </p:cNvSpPr>
-          <p:nvPr>
-            <p:ph type="pic" idx="14" sz="quarter"/>
-          </p:nvPr>
-        </p:nvSpPr>
-        <p:spPr/>
       </p:sp>
       <p:sp>
         <p:nvSpPr>
@@ -4749,6 +4869,30 @@
           </a:ln>
         </p:spPr>
       </p:pic>
+      <p:pic>
+        <p:nvPicPr>
+          <p:cNvPr id="8" name="Picture 7" descr="consulting_company_logo.png"/>
+          <p:cNvPicPr>
+            <a:picLocks noChangeAspect="1"/>
+          </p:cNvPicPr>
+          <p:nvPr/>
+        </p:nvPicPr>
+        <p:blipFill>
+          <a:blip r:embed="rId3"/>
+          <a:stretch>
+            <a:fillRect/>
+          </a:stretch>
+        </p:blipFill>
+        <p:spPr>
+          <a:xfrm>
+            <a:off x="313592" y="4536078"/>
+            <a:ext cx="2130670" cy="529698"/>
+          </a:xfrm>
+          <a:prstGeom prst="rect">
+            <a:avLst/>
+          </a:prstGeom>
+        </p:spPr>
+      </p:pic>
     </p:spTree>
   </p:cSld>
   <p:clrMapOvr>
@@ -4791,18 +4935,6 @@
       </p:sp>
       <p:sp>
         <p:nvSpPr>
-          <p:cNvPr id="3" name="Picture Placeholder 2"/>
-          <p:cNvSpPr>
-            <a:spLocks noGrp="1"/>
-          </p:cNvSpPr>
-          <p:nvPr>
-            <p:ph type="pic" idx="13" sz="quarter"/>
-          </p:nvPr>
-        </p:nvSpPr>
-        <p:spPr/>
-      </p:sp>
-      <p:sp>
-        <p:nvSpPr>
           <p:cNvPr id="4" name="Text Placeholder 3"/>
           <p:cNvSpPr>
             <a:spLocks noGrp="1"/>
@@ -4921,6 +5053,30 @@
           </a:p>
         </p:txBody>
       </p:sp>
+      <p:pic>
+        <p:nvPicPr>
+          <p:cNvPr id="6" name="Picture 5" descr="consulting_company_logo.png"/>
+          <p:cNvPicPr>
+            <a:picLocks noChangeAspect="1"/>
+          </p:cNvPicPr>
+          <p:nvPr/>
+        </p:nvPicPr>
+        <p:blipFill>
+          <a:blip r:embed="rId2"/>
+          <a:stretch>
+            <a:fillRect/>
+          </a:stretch>
+        </p:blipFill>
+        <p:spPr>
+          <a:xfrm>
+            <a:off x="313593" y="4536078"/>
+            <a:ext cx="2143858" cy="529698"/>
+          </a:xfrm>
+          <a:prstGeom prst="rect">
+            <a:avLst/>
+          </a:prstGeom>
+        </p:spPr>
+      </p:pic>
     </p:spTree>
   </p:cSld>
   <p:clrMapOvr>
@@ -4960,18 +5116,6 @@
             </a:r>
           </a:p>
         </p:txBody>
-      </p:sp>
-      <p:sp>
-        <p:nvSpPr>
-          <p:cNvPr id="3" name="Picture Placeholder 2"/>
-          <p:cNvSpPr>
-            <a:spLocks noGrp="1"/>
-          </p:cNvSpPr>
-          <p:nvPr>
-            <p:ph type="pic" idx="13" sz="quarter"/>
-          </p:nvPr>
-        </p:nvSpPr>
-        <p:spPr/>
       </p:sp>
       <p:graphicFrame>
         <p:nvGraphicFramePr>
@@ -5328,6 +5472,30 @@
           </a:p>
         </p:txBody>
       </p:sp>
+      <p:pic>
+        <p:nvPicPr>
+          <p:cNvPr id="6" name="Picture 5" descr="consulting_company_logo.png"/>
+          <p:cNvPicPr>
+            <a:picLocks noChangeAspect="1"/>
+          </p:cNvPicPr>
+          <p:nvPr/>
+        </p:nvPicPr>
+        <p:blipFill>
+          <a:blip r:embed="rId2"/>
+          <a:stretch>
+            <a:fillRect/>
+          </a:stretch>
+        </p:blipFill>
+        <p:spPr>
+          <a:xfrm>
+            <a:off x="313592" y="4536078"/>
+            <a:ext cx="2126273" cy="529698"/>
+          </a:xfrm>
+          <a:prstGeom prst="rect">
+            <a:avLst/>
+          </a:prstGeom>
+        </p:spPr>
+      </p:pic>
     </p:spTree>
   </p:cSld>
   <p:clrMapOvr>
@@ -5370,18 +5538,6 @@
       </p:sp>
       <p:sp>
         <p:nvSpPr>
-          <p:cNvPr id="3" name="Picture Placeholder 2"/>
-          <p:cNvSpPr>
-            <a:spLocks noGrp="1"/>
-          </p:cNvSpPr>
-          <p:nvPr>
-            <p:ph type="pic" idx="13" sz="quarter"/>
-          </p:nvPr>
-        </p:nvSpPr>
-        <p:spPr/>
-      </p:sp>
-      <p:sp>
-        <p:nvSpPr>
           <p:cNvPr id="4" name="Text Placeholder 3"/>
           <p:cNvSpPr>
             <a:spLocks noGrp="1"/>
@@ -5489,6 +5645,30 @@
           </a:p>
         </p:txBody>
       </p:sp>
+      <p:pic>
+        <p:nvPicPr>
+          <p:cNvPr id="6" name="Picture 5" descr="consulting_company_logo.png"/>
+          <p:cNvPicPr>
+            <a:picLocks noChangeAspect="1"/>
+          </p:cNvPicPr>
+          <p:nvPr/>
+        </p:nvPicPr>
+        <p:blipFill>
+          <a:blip r:embed="rId2"/>
+          <a:stretch>
+            <a:fillRect/>
+          </a:stretch>
+        </p:blipFill>
+        <p:spPr>
+          <a:xfrm>
+            <a:off x="313593" y="4536078"/>
+            <a:ext cx="2143858" cy="529698"/>
+          </a:xfrm>
+          <a:prstGeom prst="rect">
+            <a:avLst/>
+          </a:prstGeom>
+        </p:spPr>
+      </p:pic>
     </p:spTree>
   </p:cSld>
   <p:clrMapOvr>
@@ -5531,18 +5711,6 @@
       </p:sp>
       <p:sp>
         <p:nvSpPr>
-          <p:cNvPr id="3" name="Picture Placeholder 2"/>
-          <p:cNvSpPr>
-            <a:spLocks noGrp="1"/>
-          </p:cNvSpPr>
-          <p:nvPr>
-            <p:ph type="pic" idx="14" sz="quarter"/>
-          </p:nvPr>
-        </p:nvSpPr>
-        <p:spPr/>
-      </p:sp>
-      <p:sp>
-        <p:nvSpPr>
           <p:cNvPr id="4" name="Text Placeholder 3"/>
           <p:cNvSpPr>
             <a:spLocks noGrp="1"/>
@@ -5664,6 +5832,30 @@
           </a:p>
         </p:txBody>
       </p:sp>
+      <p:pic>
+        <p:nvPicPr>
+          <p:cNvPr id="7" name="Picture 6" descr="consulting_company_logo.png"/>
+          <p:cNvPicPr>
+            <a:picLocks noChangeAspect="1"/>
+          </p:cNvPicPr>
+          <p:nvPr/>
+        </p:nvPicPr>
+        <p:blipFill>
+          <a:blip r:embed="rId2"/>
+          <a:stretch>
+            <a:fillRect/>
+          </a:stretch>
+        </p:blipFill>
+        <p:spPr>
+          <a:xfrm>
+            <a:off x="313592" y="4536078"/>
+            <a:ext cx="2121877" cy="529698"/>
+          </a:xfrm>
+          <a:prstGeom prst="rect">
+            <a:avLst/>
+          </a:prstGeom>
+        </p:spPr>
+      </p:pic>
     </p:spTree>
   </p:cSld>
   <p:clrMapOvr>
@@ -5703,18 +5895,6 @@
             </a:r>
           </a:p>
         </p:txBody>
-      </p:sp>
-      <p:sp>
-        <p:nvSpPr>
-          <p:cNvPr id="3" name="Picture Placeholder 2"/>
-          <p:cNvSpPr>
-            <a:spLocks noGrp="1"/>
-          </p:cNvSpPr>
-          <p:nvPr>
-            <p:ph type="pic" idx="13" sz="quarter"/>
-          </p:nvPr>
-        </p:nvSpPr>
-        <p:spPr/>
       </p:sp>
       <p:graphicFrame>
         <p:nvGraphicFramePr>
@@ -6532,6 +6712,30 @@
           </a:p>
         </p:txBody>
       </p:sp>
+      <p:pic>
+        <p:nvPicPr>
+          <p:cNvPr id="6" name="Picture 5" descr="consulting_company_logo.png"/>
+          <p:cNvPicPr>
+            <a:picLocks noChangeAspect="1"/>
+          </p:cNvPicPr>
+          <p:nvPr/>
+        </p:nvPicPr>
+        <p:blipFill>
+          <a:blip r:embed="rId2"/>
+          <a:stretch>
+            <a:fillRect/>
+          </a:stretch>
+        </p:blipFill>
+        <p:spPr>
+          <a:xfrm>
+            <a:off x="313592" y="4536078"/>
+            <a:ext cx="2126273" cy="529698"/>
+          </a:xfrm>
+          <a:prstGeom prst="rect">
+            <a:avLst/>
+          </a:prstGeom>
+        </p:spPr>
+      </p:pic>
     </p:spTree>
   </p:cSld>
   <p:clrMapOvr>

</xml_diff>